<commit_message>
Edit slides of ppt
</commit_message>
<xml_diff>
--- a/UC Berkeley Datathon Workshop.pptx
+++ b/UC Berkeley Datathon Workshop.pptx
@@ -132,6 +132,14 @@
     </p:extLst>
   </p:cmAuthor>
 </p:cmAuthorLst>
+</file>
+
+<file path=ppt/revisionInfo.xml><?xml version="1.0" encoding="utf-8"?>
+<p1510:revInfo xmlns:a="http://schemas.openxmlformats.org/drawingml/2006/main" xmlns:r="http://schemas.openxmlformats.org/officeDocument/2006/relationships" xmlns:p1510="http://schemas.microsoft.com/office/powerpoint/2015/10/main">
+  <p1510:revLst>
+    <p1510:client id="{03736821-88AA-4E5D-959B-4427FAD0B827}" v="6" dt="2020-09-10T20:39:57.015"/>
+  </p1510:revLst>
+</p1510:revInfo>
 </file>
 
 <file path=ppt/notesMasters/notesMaster1.xml><?xml version="1.0" encoding="utf-8"?>
@@ -803,12 +811,11 @@
             </a:pPr>
             <a:r>
               <a:rPr lang="en" dirty="0"/>
-              <a:t>(!) Focus only on API, don’t worry about downloading SDK bc students are directly putting the keys into the file. For API, the key is the authentication. For SDK, their functions create clients using the endpoint and key with some added functions to use if you want (think of it as a wrapper that does more).</a:t>
-            </a:r>
-            <a:endParaRPr dirty="0"/>
-          </a:p>
-          <a:p>
-            <a:pPr marL="457200" lvl="0" indent="-298450" algn="l" rtl="0">
+              <a:t>Analogy (APIs and SDKs)</a:t>
+            </a:r>
+          </a:p>
+          <a:p>
+            <a:pPr marL="914400" lvl="1" indent="-298450" algn="l" rtl="0">
               <a:spcBef>
                 <a:spcPts val="0"/>
               </a:spcBef>
@@ -820,12 +827,12 @@
             </a:pPr>
             <a:r>
               <a:rPr lang="en" dirty="0"/>
-              <a:t>Analogy: at a restaurant, they bring you a menu. The food is in the kitchen, which is the application. We are the other application. To get the food you want, you have to send a request thru the protocol (waiter) thru the endpoint (the line on the menu, e.g., “OCR” in computer vision API). They bring you the food back.</a:t>
+              <a:t>At a restaurant, they bring you a menu. The food is in the kitchen, which is the application. We are the other application. To get the food you want, you have to send a request thru the protocol (waiter) thru the endpoint (the line on the menu, e.g., “OCR” in computer vision API). They bring you the food back.</a:t>
             </a:r>
             <a:endParaRPr dirty="0"/>
           </a:p>
           <a:p>
-            <a:pPr marL="457200" lvl="0" indent="-298450" algn="l" rtl="0">
+            <a:pPr marL="914400" lvl="1" indent="-298450" algn="l" rtl="0">
               <a:spcBef>
                 <a:spcPts val="0"/>
               </a:spcBef>
@@ -878,28 +885,8 @@
             </a:pPr>
             <a:r>
               <a:rPr lang="en" dirty="0"/>
-              <a:t>POST request: when you submit a contact form, your response is put in the “response body” of the request sent to the server. </a:t>
-            </a:r>
-            <a:r>
-              <a:rPr lang="en-US" sz="1200">
-                <a:solidFill>
-                  <a:schemeClr val="dk1"/>
-                </a:solidFill>
-              </a:rPr>
-              <a:t>Example: Contact form on a website</a:t>
-            </a:r>
-          </a:p>
-          <a:p>
-            <a:pPr marL="457200" lvl="0" indent="-298450" algn="l" rtl="0">
-              <a:spcBef>
-                <a:spcPts val="0"/>
-              </a:spcBef>
-              <a:spcAft>
-                <a:spcPts val="0"/>
-              </a:spcAft>
-              <a:buSzPts val="1100"/>
-              <a:buChar char="-"/>
-            </a:pPr>
+              <a:t>POST request example: online contact form - when you submit a contact form, your response is put in the “response body” of the request sent to the server. </a:t>
+            </a:r>
             <a:endParaRPr dirty="0"/>
           </a:p>
         </p:txBody>
@@ -26183,7 +26170,7 @@
             <a:pPr algn="ctr"/>
             <a:r>
               <a:rPr lang="en" sz="2400" dirty="0"/>
-              <a:t>Azure Data &amp; AI Team</a:t>
+              <a:t>Azure AI &amp; Analytics Team</a:t>
             </a:r>
             <a:endParaRPr sz="2400" dirty="0"/>
           </a:p>
@@ -26837,6 +26824,17 @@
               <a:rPr lang="en" sz="2400" dirty="0"/>
               <a:t>Electrical Engineering and Computer Science</a:t>
             </a:r>
+          </a:p>
+          <a:p>
+            <a:pPr algn="ctr">
+              <a:spcAft>
+                <a:spcPts val="400"/>
+              </a:spcAft>
+            </a:pPr>
+            <a:r>
+              <a:rPr lang="en" sz="2400" dirty="0"/>
+              <a:t>jxiao@microsoft.com</a:t>
+            </a:r>
             <a:endParaRPr sz="2400" dirty="0"/>
           </a:p>
         </p:txBody>
@@ -26934,6 +26932,17 @@
               <a:rPr lang="en" sz="2400" dirty="0"/>
               <a:t>Statistics, Art History</a:t>
             </a:r>
+          </a:p>
+          <a:p>
+            <a:pPr algn="ctr">
+              <a:spcAft>
+                <a:spcPts val="400"/>
+              </a:spcAft>
+            </a:pPr>
+            <a:r>
+              <a:rPr lang="en" sz="2400" dirty="0"/>
+              <a:t>amawong@microsoft.com</a:t>
+            </a:r>
             <a:endParaRPr sz="2400" dirty="0"/>
           </a:p>
         </p:txBody>
@@ -27169,12 +27178,20 @@
               <a:buChar char="•"/>
             </a:pPr>
             <a:r>
+              <a:rPr lang="en" sz="2667">
+                <a:solidFill>
+                  <a:schemeClr val="dk1"/>
+                </a:solidFill>
+              </a:rPr>
+              <a:t>POST request sends data </a:t>
+            </a:r>
+            <a:r>
               <a:rPr lang="en" sz="2667" dirty="0">
                 <a:solidFill>
                   <a:schemeClr val="dk1"/>
                 </a:solidFill>
               </a:rPr>
-              <a:t>POST requests send data to the API server to make changes to a resource</a:t>
+              <a:t>to the API server to make changes to a resource</a:t>
             </a:r>
             <a:endParaRPr sz="2667" dirty="0">
               <a:solidFill>
@@ -27587,7 +27604,7 @@
         <p:spPr>
           <a:xfrm>
             <a:off x="415600" y="593367"/>
-            <a:ext cx="11360800" cy="763600"/>
+            <a:ext cx="11591916" cy="763600"/>
           </a:xfrm>
           <a:prstGeom prst="rect">
             <a:avLst/>
@@ -27601,7 +27618,7 @@
           <a:p>
             <a:r>
               <a:rPr lang="en" dirty="0"/>
-              <a:t>Demo! Calling Azure Cognitive Services</a:t>
+              <a:t>Demo! – Creating an Azure Cognitive Services Resource</a:t>
             </a:r>
             <a:endParaRPr dirty="0"/>
           </a:p>
@@ -27620,7 +27637,7 @@
         <p:spPr>
           <a:xfrm>
             <a:off x="415600" y="1536633"/>
-            <a:ext cx="6725980" cy="4555200"/>
+            <a:ext cx="4025771" cy="4555200"/>
           </a:xfrm>
           <a:prstGeom prst="rect">
             <a:avLst/>
@@ -27650,14 +27667,23 @@
               <a:buChar char="•"/>
             </a:pPr>
             <a:r>
-              <a:rPr lang="en" sz="2267" dirty="0">
+              <a:rPr lang="en-US" sz="2267" dirty="0">
                 <a:solidFill>
                   <a:schemeClr val="dk1"/>
                 </a:solidFill>
               </a:rPr>
-              <a:t>Azure Portal</a:t>
-            </a:r>
-            <a:endParaRPr sz="2267" dirty="0">
+              <a:t>Azure Student Subscription </a:t>
+            </a:r>
+            <a:r>
+              <a:rPr lang="en-US" sz="2267" dirty="0">
+                <a:solidFill>
+                  <a:schemeClr val="dk1"/>
+                </a:solidFill>
+                <a:hlinkClick r:id="rId3"/>
+              </a:rPr>
+              <a:t>https://azure.microsoft.com/en-us/free/students/</a:t>
+            </a:r>
+            <a:endParaRPr lang="en-US" sz="2267" dirty="0">
               <a:solidFill>
                 <a:schemeClr val="dk1"/>
               </a:solidFill>
@@ -27668,37 +27694,8 @@
               <a:lnSpc>
                 <a:spcPct val="90000"/>
               </a:lnSpc>
-              <a:spcAft>
-                <a:spcPts val="400"/>
-              </a:spcAft>
-              <a:buClr>
-                <a:schemeClr val="dk1"/>
-              </a:buClr>
-              <a:buSzPts val="1700"/>
-              <a:buFont typeface="Arial" panose="020B0604020202020204" pitchFamily="34" charset="0"/>
-              <a:buChar char="•"/>
-            </a:pPr>
-            <a:r>
-              <a:rPr lang="en" sz="2267" dirty="0">
-                <a:solidFill>
-                  <a:schemeClr val="dk1"/>
-                </a:solidFill>
-              </a:rPr>
-              <a:t>Python API call</a:t>
-            </a:r>
-            <a:endParaRPr sz="2267" dirty="0">
-              <a:solidFill>
-                <a:schemeClr val="dk1"/>
-              </a:solidFill>
-            </a:endParaRPr>
-          </a:p>
-          <a:p>
-            <a:pPr marL="1113348" lvl="1" indent="-342900">
-              <a:lnSpc>
-                <a:spcPct val="90000"/>
-              </a:lnSpc>
               <a:spcBef>
-                <a:spcPts val="0"/>
+                <a:spcPts val="1333"/>
               </a:spcBef>
               <a:spcAft>
                 <a:spcPts val="400"/>
@@ -27711,31 +27708,103 @@
               <a:buChar char="•"/>
             </a:pPr>
             <a:r>
-              <a:rPr lang="en" sz="2267" u="sng" dirty="0">
+              <a:rPr lang="en" sz="2267" dirty="0">
                 <a:solidFill>
-                  <a:schemeClr val="hlink"/>
+                  <a:schemeClr val="dk1"/>
                 </a:solidFill>
-                <a:hlinkClick r:id="rId3"/>
               </a:rPr>
-              <a:t>https://docs.microsoft.com/en-us/azure/cognitive-services/text-analytics/quickstarts/python</a:t>
-            </a:r>
-            <a:endParaRPr sz="2267" dirty="0">
+              <a:t>Azure Portal </a:t>
+            </a:r>
+            <a:r>
+              <a:rPr lang="en-US" sz="2267" dirty="0">
+                <a:solidFill>
+                  <a:schemeClr val="dk1"/>
+                </a:solidFill>
+                <a:hlinkClick r:id="rId4"/>
+              </a:rPr>
+              <a:t>https://portal.azure.com/</a:t>
+            </a:r>
+            <a:endParaRPr lang="en-US" sz="2267" dirty="0">
               <a:solidFill>
                 <a:schemeClr val="dk1"/>
               </a:solidFill>
             </a:endParaRPr>
           </a:p>
           <a:p>
-            <a:pPr marL="0" indent="0">
+            <a:pPr marL="160863" indent="0">
+              <a:lnSpc>
+                <a:spcPct val="90000"/>
+              </a:lnSpc>
+              <a:spcBef>
+                <a:spcPts val="1333"/>
+              </a:spcBef>
               <a:spcAft>
-                <a:spcPts val="2133"/>
+                <a:spcPts val="400"/>
               </a:spcAft>
+              <a:buClr>
+                <a:schemeClr val="dk1"/>
+              </a:buClr>
+              <a:buSzPts val="1700"/>
               <a:buNone/>
             </a:pPr>
+            <a:endParaRPr lang="en-US" sz="2267" dirty="0">
+              <a:solidFill>
+                <a:schemeClr val="dk1"/>
+              </a:solidFill>
+            </a:endParaRPr>
+          </a:p>
+          <a:p>
+            <a:pPr marL="503763" indent="-342900">
+              <a:lnSpc>
+                <a:spcPct val="90000"/>
+              </a:lnSpc>
+              <a:spcBef>
+                <a:spcPts val="1333"/>
+              </a:spcBef>
+              <a:spcAft>
+                <a:spcPts val="400"/>
+              </a:spcAft>
+              <a:buClr>
+                <a:schemeClr val="dk1"/>
+              </a:buClr>
+              <a:buSzPts val="1700"/>
+              <a:buFont typeface="Arial" panose="020B0604020202020204" pitchFamily="34" charset="0"/>
+              <a:buChar char="•"/>
+            </a:pPr>
             <a:endParaRPr dirty="0"/>
           </a:p>
         </p:txBody>
       </p:sp>
+      <p:pic>
+        <p:nvPicPr>
+          <p:cNvPr id="2" name="Picture 1">
+            <a:extLst>
+              <a:ext uri="{FF2B5EF4-FFF2-40B4-BE49-F238E27FC236}">
+                <a16:creationId xmlns:a16="http://schemas.microsoft.com/office/drawing/2014/main" id="{6D7EC233-8DD1-4D4B-A4A0-5AF1C2F4FCBF}"/>
+              </a:ext>
+            </a:extLst>
+          </p:cNvPr>
+          <p:cNvPicPr>
+            <a:picLocks noChangeAspect="1"/>
+          </p:cNvPicPr>
+          <p:nvPr/>
+        </p:nvPicPr>
+        <p:blipFill>
+          <a:blip r:embed="rId5"/>
+          <a:stretch>
+            <a:fillRect/>
+          </a:stretch>
+        </p:blipFill>
+        <p:spPr>
+          <a:xfrm>
+            <a:off x="5053510" y="1657114"/>
+            <a:ext cx="6533894" cy="4434719"/>
+          </a:xfrm>
+          <a:prstGeom prst="rect">
+            <a:avLst/>
+          </a:prstGeom>
+        </p:spPr>
+      </p:pic>
     </p:spTree>
   </p:cSld>
   <p:clrMapOvr>
@@ -27788,7 +27857,7 @@
           <a:p>
             <a:r>
               <a:rPr lang="en" dirty="0"/>
-              <a:t>Pre-requisites</a:t>
+              <a:t>Pre-requisites for today</a:t>
             </a:r>
             <a:endParaRPr dirty="0"/>
           </a:p>
@@ -27820,28 +27889,59 @@
           <a:lstStyle/>
           <a:p>
             <a:pPr>
+              <a:lnSpc>
+                <a:spcPct val="200000"/>
+              </a:lnSpc>
               <a:buFont typeface="Arial" panose="020B0604020202020204" pitchFamily="34" charset="0"/>
               <a:buChar char="•"/>
             </a:pPr>
             <a:r>
               <a:rPr lang="en" dirty="0"/>
-              <a:t>Requests library (pip install --upgrade requests)</a:t>
-            </a:r>
-            <a:endParaRPr dirty="0"/>
-          </a:p>
-          <a:p>
-            <a:pPr>
+              <a:t>Requests library</a:t>
+            </a:r>
+          </a:p>
+          <a:p>
+            <a:pPr lvl="1">
+              <a:lnSpc>
+                <a:spcPct val="200000"/>
+              </a:lnSpc>
+              <a:spcAft>
+                <a:spcPts val="400"/>
+              </a:spcAft>
               <a:buFont typeface="Arial" panose="020B0604020202020204" pitchFamily="34" charset="0"/>
               <a:buChar char="•"/>
             </a:pPr>
             <a:r>
               <a:rPr lang="en" dirty="0"/>
+              <a:t>pip install --upgrade requests</a:t>
+            </a:r>
+            <a:endParaRPr dirty="0"/>
+          </a:p>
+          <a:p>
+            <a:pPr>
+              <a:lnSpc>
+                <a:spcPct val="200000"/>
+              </a:lnSpc>
+              <a:spcAft>
+                <a:spcPts val="400"/>
+              </a:spcAft>
+              <a:buFont typeface="Arial" panose="020B0604020202020204" pitchFamily="34" charset="0"/>
+              <a:buChar char="•"/>
+            </a:pPr>
+            <a:r>
+              <a:rPr lang="en" dirty="0"/>
               <a:t>Jupyter Notebooks/IDE</a:t>
             </a:r>
             <a:endParaRPr dirty="0"/>
           </a:p>
           <a:p>
             <a:pPr>
+              <a:lnSpc>
+                <a:spcPct val="200000"/>
+              </a:lnSpc>
+              <a:spcAft>
+                <a:spcPts val="400"/>
+              </a:spcAft>
               <a:buFont typeface="Arial" panose="020B0604020202020204" pitchFamily="34" charset="0"/>
               <a:buChar char="•"/>
             </a:pPr>
@@ -27905,7 +28005,7 @@
           <a:p>
             <a:r>
               <a:rPr lang="en" dirty="0"/>
-              <a:t>LIVE Example</a:t>
+              <a:t>Demo! - Using the Text Analytics API</a:t>
             </a:r>
             <a:endParaRPr dirty="0"/>
           </a:p>
@@ -27944,7 +28044,7 @@
                 <a:spcPts val="1333"/>
               </a:spcBef>
               <a:spcAft>
-                <a:spcPts val="600"/>
+                <a:spcPts val="800"/>
               </a:spcAft>
               <a:buClr>
                 <a:schemeClr val="dk1"/>
@@ -27967,7 +28067,7 @@
                   <a:schemeClr val="dk1"/>
                 </a:solidFill>
               </a:rPr>
-              <a:t> Clone Link to Interactive Example</a:t>
+              <a:t> starter repository link</a:t>
             </a:r>
           </a:p>
           <a:p>
@@ -27979,7 +28079,7 @@
                 <a:spcPts val="0"/>
               </a:spcBef>
               <a:spcAft>
-                <a:spcPts val="600"/>
+                <a:spcPts val="800"/>
               </a:spcAft>
               <a:buClr>
                 <a:schemeClr val="dk1"/>
@@ -27993,6 +28093,7 @@
                 <a:solidFill>
                   <a:schemeClr val="hlink"/>
                 </a:solidFill>
+                <a:hlinkClick r:id="rId3"/>
               </a:rPr>
               <a:t>bit.ly/</a:t>
             </a:r>
@@ -28001,6 +28102,7 @@
                 <a:solidFill>
                   <a:schemeClr val="hlink"/>
                 </a:solidFill>
+                <a:hlinkClick r:id="rId3"/>
               </a:rPr>
               <a:t>ucb</a:t>
             </a:r>
@@ -28009,22 +28111,26 @@
                 <a:solidFill>
                   <a:schemeClr val="hlink"/>
                 </a:solidFill>
+                <a:hlinkClick r:id="rId3"/>
               </a:rPr>
               <a:t>-azure</a:t>
             </a:r>
-            <a:endParaRPr lang="en-US" sz="2267" dirty="0">
+            <a:endParaRPr lang="en-US" sz="2267" u="sng" dirty="0">
               <a:solidFill>
-                <a:schemeClr val="dk1"/>
+                <a:schemeClr val="hlink"/>
               </a:solidFill>
             </a:endParaRPr>
           </a:p>
           <a:p>
-            <a:pPr indent="-448722">
+            <a:pPr lvl="1" indent="-448722">
               <a:lnSpc>
                 <a:spcPct val="90000"/>
               </a:lnSpc>
+              <a:spcBef>
+                <a:spcPts val="0"/>
+              </a:spcBef>
               <a:spcAft>
-                <a:spcPts val="600"/>
+                <a:spcPts val="800"/>
               </a:spcAft>
               <a:buClr>
                 <a:schemeClr val="dk1"/>
@@ -28033,27 +28139,19 @@
               <a:buFont typeface="Arial" panose="020B0604020202020204" pitchFamily="34" charset="0"/>
               <a:buChar char="•"/>
             </a:pPr>
-            <a:r>
-              <a:rPr lang="en" sz="2267" dirty="0">
-                <a:solidFill>
-                  <a:schemeClr val="dk1"/>
-                </a:solidFill>
-              </a:rPr>
-              <a:t>Python SDK access to text analytics</a:t>
-            </a:r>
-            <a:endParaRPr sz="2267" dirty="0">
+            <a:endParaRPr lang="en-US" sz="2267" u="sng" dirty="0">
               <a:solidFill>
-                <a:schemeClr val="dk1"/>
+                <a:schemeClr val="hlink"/>
               </a:solidFill>
             </a:endParaRPr>
           </a:p>
           <a:p>
-            <a:pPr indent="-448722">
+            <a:pPr marL="503763" indent="-342900">
               <a:lnSpc>
                 <a:spcPct val="90000"/>
               </a:lnSpc>
               <a:spcAft>
-                <a:spcPts val="600"/>
+                <a:spcPts val="400"/>
               </a:spcAft>
               <a:buClr>
                 <a:schemeClr val="dk1"/>
@@ -28063,27 +28161,93 @@
               <a:buChar char="•"/>
             </a:pPr>
             <a:r>
+              <a:rPr lang="fi-FI" sz="2267" dirty="0">
+                <a:solidFill>
+                  <a:schemeClr val="dk1"/>
+                </a:solidFill>
+              </a:rPr>
+              <a:t>How to use keys and endpoints</a:t>
+            </a:r>
+          </a:p>
+          <a:p>
+            <a:pPr marL="1113348" lvl="1" indent="-342900">
+              <a:lnSpc>
+                <a:spcPct val="90000"/>
+              </a:lnSpc>
+              <a:spcBef>
+                <a:spcPts val="0"/>
+              </a:spcBef>
+              <a:spcAft>
+                <a:spcPts val="400"/>
+              </a:spcAft>
+              <a:buClr>
+                <a:schemeClr val="dk1"/>
+              </a:buClr>
+              <a:buSzPts val="1700"/>
+              <a:buFont typeface="Arial" panose="020B0604020202020204" pitchFamily="34" charset="0"/>
+              <a:buChar char="•"/>
+            </a:pPr>
+            <a:r>
+              <a:rPr lang="fi-FI" sz="2267" u="sng" dirty="0">
+                <a:solidFill>
+                  <a:schemeClr val="hlink"/>
+                </a:solidFill>
+                <a:hlinkClick r:id="rId4"/>
+              </a:rPr>
+              <a:t>https://docs.microsoft.com/en-us/azure/cognitive-services/text-analytics/quickstarts/python</a:t>
+            </a:r>
+            <a:endParaRPr lang="fi-FI" sz="2267" u="sng" dirty="0">
+              <a:solidFill>
+                <a:schemeClr val="hlink"/>
+              </a:solidFill>
+            </a:endParaRPr>
+          </a:p>
+          <a:p>
+            <a:pPr marL="770448" lvl="1" indent="0">
+              <a:lnSpc>
+                <a:spcPct val="90000"/>
+              </a:lnSpc>
+              <a:spcBef>
+                <a:spcPts val="0"/>
+              </a:spcBef>
+              <a:spcAft>
+                <a:spcPts val="400"/>
+              </a:spcAft>
+              <a:buClr>
+                <a:schemeClr val="dk1"/>
+              </a:buClr>
+              <a:buSzPts val="1700"/>
+              <a:buNone/>
+            </a:pPr>
+            <a:endParaRPr lang="en-US" sz="2267" dirty="0">
+              <a:solidFill>
+                <a:schemeClr val="dk1"/>
+              </a:solidFill>
+            </a:endParaRPr>
+          </a:p>
+          <a:p>
+            <a:pPr indent="-448722">
+              <a:lnSpc>
+                <a:spcPct val="90000"/>
+              </a:lnSpc>
+              <a:spcAft>
+                <a:spcPts val="800"/>
+              </a:spcAft>
+              <a:buClr>
+                <a:schemeClr val="dk1"/>
+              </a:buClr>
+              <a:buSzPts val="1700"/>
+              <a:buFont typeface="Arial" panose="020B0604020202020204" pitchFamily="34" charset="0"/>
+              <a:buChar char="•"/>
+            </a:pPr>
+            <a:r>
               <a:rPr lang="en" sz="2267" dirty="0">
                 <a:solidFill>
                   <a:schemeClr val="dk1"/>
                 </a:solidFill>
               </a:rPr>
-              <a:t>Parsing JSON request [already in code]</a:t>
-            </a:r>
-            <a:endParaRPr sz="2267" dirty="0">
-              <a:solidFill>
-                <a:schemeClr val="dk1"/>
-              </a:solidFill>
-            </a:endParaRPr>
-          </a:p>
-          <a:p>
-            <a:pPr marL="0" indent="0">
-              <a:spcAft>
-                <a:spcPts val="2133"/>
-              </a:spcAft>
-              <a:buNone/>
-            </a:pPr>
-            <a:endParaRPr dirty="0"/>
+              <a:t>Python API access to text analytics</a:t>
+            </a:r>
           </a:p>
         </p:txBody>
       </p:sp>
@@ -28979,8 +29143,7 @@
 <file path=customXml/item1.xml><?xml version="1.0" encoding="utf-8"?>
 <p:properties xmlns:p="http://schemas.microsoft.com/office/2006/metadata/properties" xmlns:xsi="http://www.w3.org/2001/XMLSchema-instance" xmlns:pc="http://schemas.microsoft.com/office/infopath/2007/PartnerControls">
   <documentManagement>
-    <MediaServiceKeyPoints xmlns="e57c25b2-d86a-433e-9f9d-fbf06a1663e7" xsi:nil="true"/>
-    <SharedWithUsers xmlns="22f7c419-7c1b-4730-b3bb-0f0d9268f350">
+    <SharedWithUsers xmlns="cf780951-6729-4e97-85b6-84ced802b258">
       <UserInfo>
         <DisplayName>Bharat Sandhu</DisplayName>
         <AccountId>21</AccountId>
@@ -29001,28 +29164,18 @@
 </file>
 
 <file path=customXml/item3.xml><?xml version="1.0" encoding="utf-8"?>
-<ct:contentTypeSchema xmlns:ct="http://schemas.microsoft.com/office/2006/metadata/contentType" xmlns:ma="http://schemas.microsoft.com/office/2006/metadata/properties/metaAttributes" ct:_="" ma:_="" ma:contentTypeName="Document" ma:contentTypeID="0x0101001CB95BEC5583C04D8225BBE567D769F9" ma:contentTypeVersion="12" ma:contentTypeDescription="Create a new document." ma:contentTypeScope="" ma:versionID="898b4d43d3a00cde123d9dca9ce996d7">
-  <xsd:schema xmlns:xsd="http://www.w3.org/2001/XMLSchema" xmlns:xs="http://www.w3.org/2001/XMLSchema" xmlns:p="http://schemas.microsoft.com/office/2006/metadata/properties" xmlns:ns2="e57c25b2-d86a-433e-9f9d-fbf06a1663e7" xmlns:ns3="22f7c419-7c1b-4730-b3bb-0f0d9268f350" targetNamespace="http://schemas.microsoft.com/office/2006/metadata/properties" ma:root="true" ma:fieldsID="fe8bf9cd0bb8159bac3239f4ff7ac826" ns2:_="" ns3:_="">
-    <xsd:import namespace="e57c25b2-d86a-433e-9f9d-fbf06a1663e7"/>
-    <xsd:import namespace="22f7c419-7c1b-4730-b3bb-0f0d9268f350"/>
+<ct:contentTypeSchema xmlns:ct="http://schemas.microsoft.com/office/2006/metadata/contentType" xmlns:ma="http://schemas.microsoft.com/office/2006/metadata/properties/metaAttributes" ct:_="" ma:_="" ma:contentTypeName="Document" ma:contentTypeID="0x0101003B85B3D56A17944584754D8912A6C5AC" ma:contentTypeVersion="3" ma:contentTypeDescription="Create a new document." ma:contentTypeScope="" ma:versionID="462a860079b6fad9aedb21f8af05eb34">
+  <xsd:schema xmlns:xsd="http://www.w3.org/2001/XMLSchema" xmlns:xs="http://www.w3.org/2001/XMLSchema" xmlns:p="http://schemas.microsoft.com/office/2006/metadata/properties" xmlns:ns3="cf780951-6729-4e97-85b6-84ced802b258" targetNamespace="http://schemas.microsoft.com/office/2006/metadata/properties" ma:root="true" ma:fieldsID="6b71f8a2801c206e576fb34c286f4eeb" ns3:_="">
+    <xsd:import namespace="cf780951-6729-4e97-85b6-84ced802b258"/>
     <xsd:element name="properties">
       <xsd:complexType>
         <xsd:sequence>
           <xsd:element name="documentManagement">
             <xsd:complexType>
               <xsd:all>
-                <xsd:element ref="ns2:MediaServiceMetadata" minOccurs="0"/>
-                <xsd:element ref="ns2:MediaServiceFastMetadata" minOccurs="0"/>
                 <xsd:element ref="ns3:SharedWithUsers" minOccurs="0"/>
                 <xsd:element ref="ns3:SharedWithDetails" minOccurs="0"/>
-                <xsd:element ref="ns2:MediaServiceAutoTags" minOccurs="0"/>
-                <xsd:element ref="ns2:MediaServiceDateTaken" minOccurs="0"/>
-                <xsd:element ref="ns2:MediaServiceAutoKeyPoints" minOccurs="0"/>
-                <xsd:element ref="ns2:MediaServiceKeyPoints" minOccurs="0"/>
-                <xsd:element ref="ns2:MediaServiceOCR" minOccurs="0"/>
-                <xsd:element ref="ns2:MediaServiceGenerationTime" minOccurs="0"/>
-                <xsd:element ref="ns2:MediaServiceEventHashCode" minOccurs="0"/>
-                <xsd:element ref="ns2:MediaServiceLocation" minOccurs="0"/>
+                <xsd:element ref="ns3:SharingHintHash" minOccurs="0"/>
               </xsd:all>
             </xsd:complexType>
           </xsd:element>
@@ -29030,68 +29183,10 @@
       </xsd:complexType>
     </xsd:element>
   </xsd:schema>
-  <xsd:schema xmlns:xsd="http://www.w3.org/2001/XMLSchema" xmlns:xs="http://www.w3.org/2001/XMLSchema" xmlns:dms="http://schemas.microsoft.com/office/2006/documentManagement/types" xmlns:pc="http://schemas.microsoft.com/office/infopath/2007/PartnerControls" targetNamespace="e57c25b2-d86a-433e-9f9d-fbf06a1663e7" elementFormDefault="qualified">
+  <xsd:schema xmlns:xsd="http://www.w3.org/2001/XMLSchema" xmlns:xs="http://www.w3.org/2001/XMLSchema" xmlns:dms="http://schemas.microsoft.com/office/2006/documentManagement/types" xmlns:pc="http://schemas.microsoft.com/office/infopath/2007/PartnerControls" targetNamespace="cf780951-6729-4e97-85b6-84ced802b258" elementFormDefault="qualified">
     <xsd:import namespace="http://schemas.microsoft.com/office/2006/documentManagement/types"/>
     <xsd:import namespace="http://schemas.microsoft.com/office/infopath/2007/PartnerControls"/>
-    <xsd:element name="MediaServiceMetadata" ma:index="8" nillable="true" ma:displayName="MediaServiceMetadata" ma:hidden="true" ma:internalName="MediaServiceMetadata" ma:readOnly="true">
-      <xsd:simpleType>
-        <xsd:restriction base="dms:Note"/>
-      </xsd:simpleType>
-    </xsd:element>
-    <xsd:element name="MediaServiceFastMetadata" ma:index="9" nillable="true" ma:displayName="MediaServiceFastMetadata" ma:hidden="true" ma:internalName="MediaServiceFastMetadata" ma:readOnly="true">
-      <xsd:simpleType>
-        <xsd:restriction base="dms:Note"/>
-      </xsd:simpleType>
-    </xsd:element>
-    <xsd:element name="MediaServiceAutoTags" ma:index="12" nillable="true" ma:displayName="Tags" ma:internalName="MediaServiceAutoTags" ma:readOnly="true">
-      <xsd:simpleType>
-        <xsd:restriction base="dms:Text"/>
-      </xsd:simpleType>
-    </xsd:element>
-    <xsd:element name="MediaServiceDateTaken" ma:index="13" nillable="true" ma:displayName="MediaServiceDateTaken" ma:hidden="true" ma:internalName="MediaServiceDateTaken" ma:readOnly="true">
-      <xsd:simpleType>
-        <xsd:restriction base="dms:Text"/>
-      </xsd:simpleType>
-    </xsd:element>
-    <xsd:element name="MediaServiceAutoKeyPoints" ma:index="14" nillable="true" ma:displayName="MediaServiceAutoKeyPoints" ma:hidden="true" ma:internalName="MediaServiceAutoKeyPoints" ma:readOnly="true">
-      <xsd:simpleType>
-        <xsd:restriction base="dms:Note"/>
-      </xsd:simpleType>
-    </xsd:element>
-    <xsd:element name="MediaServiceKeyPoints" ma:index="15" nillable="true" ma:displayName="KeyPoints" ma:internalName="MediaServiceKeyPoints" ma:readOnly="false">
-      <xsd:simpleType>
-        <xsd:restriction base="dms:Note">
-          <xsd:maxLength value="255"/>
-        </xsd:restriction>
-      </xsd:simpleType>
-    </xsd:element>
-    <xsd:element name="MediaServiceOCR" ma:index="16" nillable="true" ma:displayName="Extracted Text" ma:internalName="MediaServiceOCR" ma:readOnly="true">
-      <xsd:simpleType>
-        <xsd:restriction base="dms:Note">
-          <xsd:maxLength value="255"/>
-        </xsd:restriction>
-      </xsd:simpleType>
-    </xsd:element>
-    <xsd:element name="MediaServiceGenerationTime" ma:index="17" nillable="true" ma:displayName="MediaServiceGenerationTime" ma:hidden="true" ma:internalName="MediaServiceGenerationTime" ma:readOnly="true">
-      <xsd:simpleType>
-        <xsd:restriction base="dms:Text"/>
-      </xsd:simpleType>
-    </xsd:element>
-    <xsd:element name="MediaServiceEventHashCode" ma:index="18" nillable="true" ma:displayName="MediaServiceEventHashCode" ma:hidden="true" ma:internalName="MediaServiceEventHashCode" ma:readOnly="true">
-      <xsd:simpleType>
-        <xsd:restriction base="dms:Text"/>
-      </xsd:simpleType>
-    </xsd:element>
-    <xsd:element name="MediaServiceLocation" ma:index="19" nillable="true" ma:displayName="Location" ma:internalName="MediaServiceLocation" ma:readOnly="true">
-      <xsd:simpleType>
-        <xsd:restriction base="dms:Text"/>
-      </xsd:simpleType>
-    </xsd:element>
-  </xsd:schema>
-  <xsd:schema xmlns:xsd="http://www.w3.org/2001/XMLSchema" xmlns:xs="http://www.w3.org/2001/XMLSchema" xmlns:dms="http://schemas.microsoft.com/office/2006/documentManagement/types" xmlns:pc="http://schemas.microsoft.com/office/infopath/2007/PartnerControls" targetNamespace="22f7c419-7c1b-4730-b3bb-0f0d9268f350" elementFormDefault="qualified">
-    <xsd:import namespace="http://schemas.microsoft.com/office/2006/documentManagement/types"/>
-    <xsd:import namespace="http://schemas.microsoft.com/office/infopath/2007/PartnerControls"/>
-    <xsd:element name="SharedWithUsers" ma:index="10" nillable="true" ma:displayName="Shared With" ma:internalName="SharedWithUsers" ma:readOnly="true">
+    <xsd:element name="SharedWithUsers" ma:index="8" nillable="true" ma:displayName="Shared With" ma:internalName="SharedWithUsers" ma:readOnly="true">
       <xsd:complexType>
         <xsd:complexContent>
           <xsd:extension base="dms:UserMulti">
@@ -29110,11 +29205,16 @@
         </xsd:complexContent>
       </xsd:complexType>
     </xsd:element>
-    <xsd:element name="SharedWithDetails" ma:index="11" nillable="true" ma:displayName="Shared With Details" ma:internalName="SharedWithDetails" ma:readOnly="true">
+    <xsd:element name="SharedWithDetails" ma:index="9" nillable="true" ma:displayName="Shared With Details" ma:internalName="SharedWithDetails" ma:readOnly="true">
       <xsd:simpleType>
         <xsd:restriction base="dms:Note">
           <xsd:maxLength value="255"/>
         </xsd:restriction>
+      </xsd:simpleType>
+    </xsd:element>
+    <xsd:element name="SharingHintHash" ma:index="10" nillable="true" ma:displayName="Sharing Hint Hash" ma:hidden="true" ma:internalName="SharingHintHash" ma:readOnly="true">
+      <xsd:simpleType>
+        <xsd:restriction base="dms:Text"/>
       </xsd:simpleType>
     </xsd:element>
   </xsd:schema>
@@ -29220,16 +29320,15 @@
 <file path=customXml/itemProps1.xml><?xml version="1.0" encoding="utf-8"?>
 <ds:datastoreItem xmlns:ds="http://schemas.openxmlformats.org/officeDocument/2006/customXml" ds:itemID="{36BE30E9-6C01-4B42-9B2C-2493A73D79FE}">
   <ds:schemaRefs>
+    <ds:schemaRef ds:uri="http://schemas.microsoft.com/office/infopath/2007/PartnerControls"/>
+    <ds:schemaRef ds:uri="http://schemas.microsoft.com/office/2006/documentManagement/types"/>
+    <ds:schemaRef ds:uri="http://schemas.openxmlformats.org/package/2006/metadata/core-properties"/>
+    <ds:schemaRef ds:uri="http://schemas.microsoft.com/office/2006/metadata/properties"/>
     <ds:schemaRef ds:uri="http://www.w3.org/XML/1998/namespace"/>
     <ds:schemaRef ds:uri="http://purl.org/dc/terms/"/>
     <ds:schemaRef ds:uri="http://purl.org/dc/dcmitype/"/>
+    <ds:schemaRef ds:uri="cf780951-6729-4e97-85b6-84ced802b258"/>
     <ds:schemaRef ds:uri="http://purl.org/dc/elements/1.1/"/>
-    <ds:schemaRef ds:uri="e57c25b2-d86a-433e-9f9d-fbf06a1663e7"/>
-    <ds:schemaRef ds:uri="http://schemas.microsoft.com/office/2006/documentManagement/types"/>
-    <ds:schemaRef ds:uri="http://schemas.openxmlformats.org/package/2006/metadata/core-properties"/>
-    <ds:schemaRef ds:uri="http://schemas.microsoft.com/office/infopath/2007/PartnerControls"/>
-    <ds:schemaRef ds:uri="22f7c419-7c1b-4730-b3bb-0f0d9268f350"/>
-    <ds:schemaRef ds:uri="http://schemas.microsoft.com/office/2006/metadata/properties"/>
   </ds:schemaRefs>
 </ds:datastoreItem>
 </file>
@@ -29243,14 +29342,13 @@
 </file>
 
 <file path=customXml/itemProps3.xml><?xml version="1.0" encoding="utf-8"?>
-<ds:datastoreItem xmlns:ds="http://schemas.openxmlformats.org/officeDocument/2006/customXml" ds:itemID="{853C0913-EE81-4440-A234-5B095D16724E}">
+<ds:datastoreItem xmlns:ds="http://schemas.openxmlformats.org/officeDocument/2006/customXml" ds:itemID="{3803F5BB-BD93-48C5-9540-885052F233C8}">
   <ds:schemaRefs>
     <ds:schemaRef ds:uri="http://schemas.microsoft.com/office/2006/metadata/contentType"/>
     <ds:schemaRef ds:uri="http://schemas.microsoft.com/office/2006/metadata/properties/metaAttributes"/>
     <ds:schemaRef ds:uri="http://www.w3.org/2001/XMLSchema"/>
     <ds:schemaRef ds:uri="http://schemas.microsoft.com/office/2006/metadata/properties"/>
-    <ds:schemaRef ds:uri="e57c25b2-d86a-433e-9f9d-fbf06a1663e7"/>
-    <ds:schemaRef ds:uri="22f7c419-7c1b-4730-b3bb-0f0d9268f350"/>
+    <ds:schemaRef ds:uri="cf780951-6729-4e97-85b6-84ced802b258"/>
     <ds:schemaRef ds:uri="http://schemas.microsoft.com/office/2006/documentManagement/types"/>
     <ds:schemaRef ds:uri="http://schemas.microsoft.com/office/infopath/2007/PartnerControls"/>
     <ds:schemaRef ds:uri="http://schemas.openxmlformats.org/package/2006/metadata/core-properties"/>

</xml_diff>

<commit_message>
Add new links to README and ppt
</commit_message>
<xml_diff>
--- a/UC Berkeley Datathon Workshop.pptx
+++ b/UC Berkeley Datathon Workshop.pptx
@@ -224,7 +224,7 @@
           <a:p>
             <a:fld id="{95BBCCFB-AE79-489B-A188-E362E1F861E4}" type="datetimeFigureOut">
               <a:rPr lang="en-US" smtClean="0"/>
-              <a:t>9/9/2020</a:t>
+              <a:t>9/10/2020</a:t>
             </a:fld>
             <a:endParaRPr lang="en-US"/>
           </a:p>
@@ -18684,7 +18684,7 @@
           <a:p>
             <a:fld id="{846CE7D5-CF57-46EF-B807-FDD0502418D4}" type="datetimeFigureOut">
               <a:rPr lang="en-US" smtClean="0"/>
-              <a:t>9/9/2020</a:t>
+              <a:t>9/10/2020</a:t>
             </a:fld>
             <a:endParaRPr lang="en-US"/>
           </a:p>
@@ -28054,20 +28054,12 @@
               <a:buChar char="•"/>
             </a:pPr>
             <a:r>
-              <a:rPr lang="en-US" sz="2267" dirty="0" err="1">
-                <a:solidFill>
-                  <a:schemeClr val="dk1"/>
-                </a:solidFill>
-              </a:rPr>
-              <a:t>Github</a:t>
-            </a:r>
-            <a:r>
               <a:rPr lang="en-US" sz="2267" dirty="0">
                 <a:solidFill>
                   <a:schemeClr val="dk1"/>
                 </a:solidFill>
               </a:rPr>
-              <a:t> starter repository link</a:t>
+              <a:t>GitHub starter repository link</a:t>
             </a:r>
           </a:p>
           <a:p>
@@ -28095,25 +28087,7 @@
                 </a:solidFill>
                 <a:hlinkClick r:id="rId3"/>
               </a:rPr>
-              <a:t>bit.ly/</a:t>
-            </a:r>
-            <a:r>
-              <a:rPr lang="en-US" sz="2267" u="sng" dirty="0" err="1">
-                <a:solidFill>
-                  <a:schemeClr val="hlink"/>
-                </a:solidFill>
-                <a:hlinkClick r:id="rId3"/>
-              </a:rPr>
-              <a:t>ucb</a:t>
-            </a:r>
-            <a:r>
-              <a:rPr lang="en-US" sz="2267" u="sng" dirty="0">
-                <a:solidFill>
-                  <a:schemeClr val="hlink"/>
-                </a:solidFill>
-                <a:hlinkClick r:id="rId3"/>
-              </a:rPr>
-              <a:t>-azure</a:t>
+              <a:t>http://bit.ly/berkeley-azure</a:t>
             </a:r>
             <a:endParaRPr lang="en-US" sz="2267" u="sng" dirty="0">
               <a:solidFill>
@@ -29141,29 +29115,6 @@
 </file>
 
 <file path=customXml/item1.xml><?xml version="1.0" encoding="utf-8"?>
-<p:properties xmlns:p="http://schemas.microsoft.com/office/2006/metadata/properties" xmlns:xsi="http://www.w3.org/2001/XMLSchema-instance" xmlns:pc="http://schemas.microsoft.com/office/infopath/2007/PartnerControls">
-  <documentManagement>
-    <SharedWithUsers xmlns="cf780951-6729-4e97-85b6-84ced802b258">
-      <UserInfo>
-        <DisplayName>Bharat Sandhu</DisplayName>
-        <AccountId>21</AccountId>
-        <AccountType/>
-      </UserInfo>
-    </SharedWithUsers>
-  </documentManagement>
-</p:properties>
-</file>
-
-<file path=customXml/item2.xml><?xml version="1.0" encoding="utf-8"?>
-<?mso-contentType ?>
-<FormTemplates xmlns="http://schemas.microsoft.com/sharepoint/v3/contenttype/forms">
-  <Display>DocumentLibraryForm</Display>
-  <Edit>DocumentLibraryForm</Edit>
-  <New>DocumentLibraryForm</New>
-</FormTemplates>
-</file>
-
-<file path=customXml/item3.xml><?xml version="1.0" encoding="utf-8"?>
 <ct:contentTypeSchema xmlns:ct="http://schemas.microsoft.com/office/2006/metadata/contentType" xmlns:ma="http://schemas.microsoft.com/office/2006/metadata/properties/metaAttributes" ct:_="" ma:_="" ma:contentTypeName="Document" ma:contentTypeID="0x0101003B85B3D56A17944584754D8912A6C5AC" ma:contentTypeVersion="3" ma:contentTypeDescription="Create a new document." ma:contentTypeScope="" ma:versionID="462a860079b6fad9aedb21f8af05eb34">
   <xsd:schema xmlns:xsd="http://www.w3.org/2001/XMLSchema" xmlns:xs="http://www.w3.org/2001/XMLSchema" xmlns:p="http://schemas.microsoft.com/office/2006/metadata/properties" xmlns:ns3="cf780951-6729-4e97-85b6-84ced802b258" targetNamespace="http://schemas.microsoft.com/office/2006/metadata/properties" ma:root="true" ma:fieldsID="6b71f8a2801c206e576fb34c286f4eeb" ns3:_="">
     <xsd:import namespace="cf780951-6729-4e97-85b6-84ced802b258"/>
@@ -29317,31 +29268,30 @@
 </ct:contentTypeSchema>
 </file>
 
-<file path=customXml/itemProps1.xml><?xml version="1.0" encoding="utf-8"?>
-<ds:datastoreItem xmlns:ds="http://schemas.openxmlformats.org/officeDocument/2006/customXml" ds:itemID="{36BE30E9-6C01-4B42-9B2C-2493A73D79FE}">
-  <ds:schemaRefs>
-    <ds:schemaRef ds:uri="http://schemas.microsoft.com/office/infopath/2007/PartnerControls"/>
-    <ds:schemaRef ds:uri="http://schemas.microsoft.com/office/2006/documentManagement/types"/>
-    <ds:schemaRef ds:uri="http://schemas.openxmlformats.org/package/2006/metadata/core-properties"/>
-    <ds:schemaRef ds:uri="http://schemas.microsoft.com/office/2006/metadata/properties"/>
-    <ds:schemaRef ds:uri="http://www.w3.org/XML/1998/namespace"/>
-    <ds:schemaRef ds:uri="http://purl.org/dc/terms/"/>
-    <ds:schemaRef ds:uri="http://purl.org/dc/dcmitype/"/>
-    <ds:schemaRef ds:uri="cf780951-6729-4e97-85b6-84ced802b258"/>
-    <ds:schemaRef ds:uri="http://purl.org/dc/elements/1.1/"/>
-  </ds:schemaRefs>
-</ds:datastoreItem>
+<file path=customXml/item2.xml><?xml version="1.0" encoding="utf-8"?>
+<?mso-contentType ?>
+<FormTemplates xmlns="http://schemas.microsoft.com/sharepoint/v3/contenttype/forms">
+  <Display>DocumentLibraryForm</Display>
+  <Edit>DocumentLibraryForm</Edit>
+  <New>DocumentLibraryForm</New>
+</FormTemplates>
 </file>
 
-<file path=customXml/itemProps2.xml><?xml version="1.0" encoding="utf-8"?>
-<ds:datastoreItem xmlns:ds="http://schemas.openxmlformats.org/officeDocument/2006/customXml" ds:itemID="{19A29821-AB42-42F7-8B06-190D4655A802}">
-  <ds:schemaRefs>
-    <ds:schemaRef ds:uri="http://schemas.microsoft.com/sharepoint/v3/contenttype/forms"/>
-  </ds:schemaRefs>
-</ds:datastoreItem>
+<file path=customXml/item3.xml><?xml version="1.0" encoding="utf-8"?>
+<p:properties xmlns:p="http://schemas.microsoft.com/office/2006/metadata/properties" xmlns:xsi="http://www.w3.org/2001/XMLSchema-instance" xmlns:pc="http://schemas.microsoft.com/office/infopath/2007/PartnerControls">
+  <documentManagement>
+    <SharedWithUsers xmlns="cf780951-6729-4e97-85b6-84ced802b258">
+      <UserInfo>
+        <DisplayName>Bharat Sandhu</DisplayName>
+        <AccountId>21</AccountId>
+        <AccountType/>
+      </UserInfo>
+    </SharedWithUsers>
+  </documentManagement>
+</p:properties>
 </file>
 
-<file path=customXml/itemProps3.xml><?xml version="1.0" encoding="utf-8"?>
+<file path=customXml/itemProps1.xml><?xml version="1.0" encoding="utf-8"?>
 <ds:datastoreItem xmlns:ds="http://schemas.openxmlformats.org/officeDocument/2006/customXml" ds:itemID="{3803F5BB-BD93-48C5-9540-885052F233C8}">
   <ds:schemaRefs>
     <ds:schemaRef ds:uri="http://schemas.microsoft.com/office/2006/metadata/contentType"/>
@@ -29357,4 +29307,28 @@
     <ds:schemaRef ds:uri="http://schemas.microsoft.com/internal/obd"/>
   </ds:schemaRefs>
 </ds:datastoreItem>
+</file>
+
+<file path=customXml/itemProps2.xml><?xml version="1.0" encoding="utf-8"?>
+<ds:datastoreItem xmlns:ds="http://schemas.openxmlformats.org/officeDocument/2006/customXml" ds:itemID="{19A29821-AB42-42F7-8B06-190D4655A802}">
+  <ds:schemaRefs>
+    <ds:schemaRef ds:uri="http://schemas.microsoft.com/sharepoint/v3/contenttype/forms"/>
+  </ds:schemaRefs>
+</ds:datastoreItem>
+</file>
+
+<file path=customXml/itemProps3.xml><?xml version="1.0" encoding="utf-8"?>
+<ds:datastoreItem xmlns:ds="http://schemas.openxmlformats.org/officeDocument/2006/customXml" ds:itemID="{36BE30E9-6C01-4B42-9B2C-2493A73D79FE}">
+  <ds:schemaRefs>
+    <ds:schemaRef ds:uri="http://schemas.microsoft.com/office/infopath/2007/PartnerControls"/>
+    <ds:schemaRef ds:uri="http://schemas.microsoft.com/office/2006/documentManagement/types"/>
+    <ds:schemaRef ds:uri="http://schemas.openxmlformats.org/package/2006/metadata/core-properties"/>
+    <ds:schemaRef ds:uri="http://schemas.microsoft.com/office/2006/metadata/properties"/>
+    <ds:schemaRef ds:uri="http://www.w3.org/XML/1998/namespace"/>
+    <ds:schemaRef ds:uri="http://purl.org/dc/terms/"/>
+    <ds:schemaRef ds:uri="http://purl.org/dc/dcmitype/"/>
+    <ds:schemaRef ds:uri="cf780951-6729-4e97-85b6-84ced802b258"/>
+    <ds:schemaRef ds:uri="http://purl.org/dc/elements/1.1/"/>
+  </ds:schemaRefs>
+</ds:datastoreItem>
 </file>
</xml_diff>

<commit_message>
New link for ppt
</commit_message>
<xml_diff>
--- a/UC Berkeley Datathon Workshop.pptx
+++ b/UC Berkeley Datathon Workshop.pptx
@@ -827,7 +827,15 @@
             </a:pPr>
             <a:r>
               <a:rPr lang="en" dirty="0"/>
-              <a:t>At a restaurant, they bring you a menu. The food is in the kitchen, which is the application. We are the other application. To get the food you want, you have to send a request thru the protocol (waiter) thru the endpoint (the line on the menu, e.g., “OCR” in computer vision API). They bring you the food back.</a:t>
+              <a:t>At a restaurant, they bring you a menu. The food is in the kitchen, which is the application</a:t>
+            </a:r>
+            <a:r>
+              <a:rPr lang="en"/>
+              <a:t>. To </a:t>
+            </a:r>
+            <a:r>
+              <a:rPr lang="en" dirty="0"/>
+              <a:t>get the food you want, you have to send a request thru the protocol (waiter) thru the endpoint (the line on the menu, e.g., “OCR” in computer vision API). They bring you the food back.</a:t>
             </a:r>
             <a:endParaRPr dirty="0"/>
           </a:p>
@@ -845,23 +853,6 @@
             <a:r>
               <a:rPr lang="en" dirty="0"/>
               <a:t>With the SDK, they bring you more with your food and the menu is the same</a:t>
-            </a:r>
-            <a:endParaRPr dirty="0"/>
-          </a:p>
-          <a:p>
-            <a:pPr marL="457200" lvl="0" indent="-298450" algn="l" rtl="0">
-              <a:spcBef>
-                <a:spcPts val="0"/>
-              </a:spcBef>
-              <a:spcAft>
-                <a:spcPts val="0"/>
-              </a:spcAft>
-              <a:buSzPts val="1100"/>
-              <a:buChar char="-"/>
-            </a:pPr>
-            <a:r>
-              <a:rPr lang="en" dirty="0"/>
-              <a:t>Note: we will give them a public key in case theirs doesn’t work</a:t>
             </a:r>
             <a:endParaRPr dirty="0"/>
           </a:p>
@@ -27932,7 +27923,25 @@
               <a:rPr lang="en" dirty="0"/>
               <a:t>Jupyter Notebooks/IDE</a:t>
             </a:r>
-            <a:endParaRPr dirty="0"/>
+          </a:p>
+          <a:p>
+            <a:pPr lvl="1">
+              <a:lnSpc>
+                <a:spcPct val="200000"/>
+              </a:lnSpc>
+              <a:spcAft>
+                <a:spcPts val="400"/>
+              </a:spcAft>
+              <a:buFont typeface="Arial" panose="020B0604020202020204" pitchFamily="34" charset="0"/>
+              <a:buChar char="•"/>
+            </a:pPr>
+            <a:r>
+              <a:rPr lang="en-US" dirty="0">
+                <a:hlinkClick r:id="rId3"/>
+              </a:rPr>
+              <a:t>http://notebooks.azure.com/</a:t>
+            </a:r>
+            <a:endParaRPr lang="en-US" dirty="0"/>
           </a:p>
           <a:p>
             <a:pPr>
@@ -27946,10 +27955,9 @@
               <a:buChar char="•"/>
             </a:pPr>
             <a:r>
-              <a:rPr lang="en" dirty="0"/>
+              <a:rPr lang="en-US" dirty="0"/>
               <a:t>Git</a:t>
             </a:r>
-            <a:endParaRPr dirty="0"/>
           </a:p>
         </p:txBody>
       </p:sp>
@@ -29115,6 +29123,29 @@
 </file>
 
 <file path=customXml/item1.xml><?xml version="1.0" encoding="utf-8"?>
+<p:properties xmlns:p="http://schemas.microsoft.com/office/2006/metadata/properties" xmlns:xsi="http://www.w3.org/2001/XMLSchema-instance" xmlns:pc="http://schemas.microsoft.com/office/infopath/2007/PartnerControls">
+  <documentManagement>
+    <SharedWithUsers xmlns="cf780951-6729-4e97-85b6-84ced802b258">
+      <UserInfo>
+        <DisplayName>Bharat Sandhu</DisplayName>
+        <AccountId>21</AccountId>
+        <AccountType/>
+      </UserInfo>
+    </SharedWithUsers>
+  </documentManagement>
+</p:properties>
+</file>
+
+<file path=customXml/item2.xml><?xml version="1.0" encoding="utf-8"?>
+<?mso-contentType ?>
+<FormTemplates xmlns="http://schemas.microsoft.com/sharepoint/v3/contenttype/forms">
+  <Display>DocumentLibraryForm</Display>
+  <Edit>DocumentLibraryForm</Edit>
+  <New>DocumentLibraryForm</New>
+</FormTemplates>
+</file>
+
+<file path=customXml/item3.xml><?xml version="1.0" encoding="utf-8"?>
 <ct:contentTypeSchema xmlns:ct="http://schemas.microsoft.com/office/2006/metadata/contentType" xmlns:ma="http://schemas.microsoft.com/office/2006/metadata/properties/metaAttributes" ct:_="" ma:_="" ma:contentTypeName="Document" ma:contentTypeID="0x0101003B85B3D56A17944584754D8912A6C5AC" ma:contentTypeVersion="3" ma:contentTypeDescription="Create a new document." ma:contentTypeScope="" ma:versionID="462a860079b6fad9aedb21f8af05eb34">
   <xsd:schema xmlns:xsd="http://www.w3.org/2001/XMLSchema" xmlns:xs="http://www.w3.org/2001/XMLSchema" xmlns:p="http://schemas.microsoft.com/office/2006/metadata/properties" xmlns:ns3="cf780951-6729-4e97-85b6-84ced802b258" targetNamespace="http://schemas.microsoft.com/office/2006/metadata/properties" ma:root="true" ma:fieldsID="6b71f8a2801c206e576fb34c286f4eeb" ns3:_="">
     <xsd:import namespace="cf780951-6729-4e97-85b6-84ced802b258"/>
@@ -29268,30 +29299,31 @@
 </ct:contentTypeSchema>
 </file>
 
-<file path=customXml/item2.xml><?xml version="1.0" encoding="utf-8"?>
-<?mso-contentType ?>
-<FormTemplates xmlns="http://schemas.microsoft.com/sharepoint/v3/contenttype/forms">
-  <Display>DocumentLibraryForm</Display>
-  <Edit>DocumentLibraryForm</Edit>
-  <New>DocumentLibraryForm</New>
-</FormTemplates>
+<file path=customXml/itemProps1.xml><?xml version="1.0" encoding="utf-8"?>
+<ds:datastoreItem xmlns:ds="http://schemas.openxmlformats.org/officeDocument/2006/customXml" ds:itemID="{36BE30E9-6C01-4B42-9B2C-2493A73D79FE}">
+  <ds:schemaRefs>
+    <ds:schemaRef ds:uri="http://schemas.microsoft.com/office/infopath/2007/PartnerControls"/>
+    <ds:schemaRef ds:uri="http://schemas.microsoft.com/office/2006/documentManagement/types"/>
+    <ds:schemaRef ds:uri="http://schemas.openxmlformats.org/package/2006/metadata/core-properties"/>
+    <ds:schemaRef ds:uri="http://schemas.microsoft.com/office/2006/metadata/properties"/>
+    <ds:schemaRef ds:uri="http://www.w3.org/XML/1998/namespace"/>
+    <ds:schemaRef ds:uri="http://purl.org/dc/terms/"/>
+    <ds:schemaRef ds:uri="http://purl.org/dc/dcmitype/"/>
+    <ds:schemaRef ds:uri="cf780951-6729-4e97-85b6-84ced802b258"/>
+    <ds:schemaRef ds:uri="http://purl.org/dc/elements/1.1/"/>
+  </ds:schemaRefs>
+</ds:datastoreItem>
 </file>
 
-<file path=customXml/item3.xml><?xml version="1.0" encoding="utf-8"?>
-<p:properties xmlns:p="http://schemas.microsoft.com/office/2006/metadata/properties" xmlns:xsi="http://www.w3.org/2001/XMLSchema-instance" xmlns:pc="http://schemas.microsoft.com/office/infopath/2007/PartnerControls">
-  <documentManagement>
-    <SharedWithUsers xmlns="cf780951-6729-4e97-85b6-84ced802b258">
-      <UserInfo>
-        <DisplayName>Bharat Sandhu</DisplayName>
-        <AccountId>21</AccountId>
-        <AccountType/>
-      </UserInfo>
-    </SharedWithUsers>
-  </documentManagement>
-</p:properties>
+<file path=customXml/itemProps2.xml><?xml version="1.0" encoding="utf-8"?>
+<ds:datastoreItem xmlns:ds="http://schemas.openxmlformats.org/officeDocument/2006/customXml" ds:itemID="{19A29821-AB42-42F7-8B06-190D4655A802}">
+  <ds:schemaRefs>
+    <ds:schemaRef ds:uri="http://schemas.microsoft.com/sharepoint/v3/contenttype/forms"/>
+  </ds:schemaRefs>
+</ds:datastoreItem>
 </file>
 
-<file path=customXml/itemProps1.xml><?xml version="1.0" encoding="utf-8"?>
+<file path=customXml/itemProps3.xml><?xml version="1.0" encoding="utf-8"?>
 <ds:datastoreItem xmlns:ds="http://schemas.openxmlformats.org/officeDocument/2006/customXml" ds:itemID="{3803F5BB-BD93-48C5-9540-885052F233C8}">
   <ds:schemaRefs>
     <ds:schemaRef ds:uri="http://schemas.microsoft.com/office/2006/metadata/contentType"/>
@@ -29307,28 +29339,4 @@
     <ds:schemaRef ds:uri="http://schemas.microsoft.com/internal/obd"/>
   </ds:schemaRefs>
 </ds:datastoreItem>
-</file>
-
-<file path=customXml/itemProps2.xml><?xml version="1.0" encoding="utf-8"?>
-<ds:datastoreItem xmlns:ds="http://schemas.openxmlformats.org/officeDocument/2006/customXml" ds:itemID="{19A29821-AB42-42F7-8B06-190D4655A802}">
-  <ds:schemaRefs>
-    <ds:schemaRef ds:uri="http://schemas.microsoft.com/sharepoint/v3/contenttype/forms"/>
-  </ds:schemaRefs>
-</ds:datastoreItem>
-</file>
-
-<file path=customXml/itemProps3.xml><?xml version="1.0" encoding="utf-8"?>
-<ds:datastoreItem xmlns:ds="http://schemas.openxmlformats.org/officeDocument/2006/customXml" ds:itemID="{36BE30E9-6C01-4B42-9B2C-2493A73D79FE}">
-  <ds:schemaRefs>
-    <ds:schemaRef ds:uri="http://schemas.microsoft.com/office/infopath/2007/PartnerControls"/>
-    <ds:schemaRef ds:uri="http://schemas.microsoft.com/office/2006/documentManagement/types"/>
-    <ds:schemaRef ds:uri="http://schemas.openxmlformats.org/package/2006/metadata/core-properties"/>
-    <ds:schemaRef ds:uri="http://schemas.microsoft.com/office/2006/metadata/properties"/>
-    <ds:schemaRef ds:uri="http://www.w3.org/XML/1998/namespace"/>
-    <ds:schemaRef ds:uri="http://purl.org/dc/terms/"/>
-    <ds:schemaRef ds:uri="http://purl.org/dc/dcmitype/"/>
-    <ds:schemaRef ds:uri="cf780951-6729-4e97-85b6-84ced802b258"/>
-    <ds:schemaRef ds:uri="http://purl.org/dc/elements/1.1/"/>
-  </ds:schemaRefs>
-</ds:datastoreItem>
 </file>
</xml_diff>